<commit_message>
Remove Bastion Template for compatibility reasons, enforce IMDSv2.
</commit_message>
<xml_diff>
--- a/docs/deployment_guide/images/darktrace-vsensor-architecture-diagram.pptx
+++ b/docs/deployment_guide/images/darktrace-vsensor-architecture-diagram.pptx
@@ -197,7 +197,7 @@
           <a:p>
             <a:fld id="{3EE5D166-DC13-7648-A242-AA94E0066721}" type="datetimeFigureOut">
               <a:rPr lang="en-US" smtClean="0"/>
-              <a:t>8/7/23</a:t>
+              <a:t>3/13/24</a:t>
             </a:fld>
             <a:endParaRPr lang="en-US"/>
           </a:p>
@@ -594,7 +594,7 @@
           <a:p>
             <a:fld id="{C288606C-66EA-F346-A769-4569CAB8A7FE}" type="datetime1">
               <a:rPr lang="en-GB" smtClean="0"/>
-              <a:t>07/08/2023</a:t>
+              <a:t>13/03/2024</a:t>
             </a:fld>
             <a:endParaRPr lang="en-US"/>
           </a:p>
@@ -762,7 +762,7 @@
           <a:p>
             <a:fld id="{95B31FE2-BABE-C149-8B70-7C3E8A7DF869}" type="datetime1">
               <a:rPr lang="en-GB" smtClean="0"/>
-              <a:t>07/08/2023</a:t>
+              <a:t>13/03/2024</a:t>
             </a:fld>
             <a:endParaRPr lang="en-US"/>
           </a:p>
@@ -940,7 +940,7 @@
           <a:p>
             <a:fld id="{3B43115A-3D21-7543-9B6A-CA76F4122AFE}" type="datetime1">
               <a:rPr lang="en-GB" smtClean="0"/>
-              <a:t>07/08/2023</a:t>
+              <a:t>13/03/2024</a:t>
             </a:fld>
             <a:endParaRPr lang="en-US"/>
           </a:p>
@@ -1108,7 +1108,7 @@
           <a:p>
             <a:fld id="{DF222077-87AF-0047-8789-8B8456756073}" type="datetime1">
               <a:rPr lang="en-GB" smtClean="0"/>
-              <a:t>07/08/2023</a:t>
+              <a:t>13/03/2024</a:t>
             </a:fld>
             <a:endParaRPr lang="en-US"/>
           </a:p>
@@ -1353,7 +1353,7 @@
           <a:p>
             <a:fld id="{584691CB-D1E4-4A47-9794-31D2C461C1E2}" type="datetime1">
               <a:rPr lang="en-GB" smtClean="0"/>
-              <a:t>07/08/2023</a:t>
+              <a:t>13/03/2024</a:t>
             </a:fld>
             <a:endParaRPr lang="en-US"/>
           </a:p>
@@ -1582,7 +1582,7 @@
           <a:p>
             <a:fld id="{B268B2F0-B352-004C-AB96-F0B66574AA8A}" type="datetime1">
               <a:rPr lang="en-GB" smtClean="0"/>
-              <a:t>07/08/2023</a:t>
+              <a:t>13/03/2024</a:t>
             </a:fld>
             <a:endParaRPr lang="en-US"/>
           </a:p>
@@ -1946,7 +1946,7 @@
           <a:p>
             <a:fld id="{52973A3F-6CDC-5F41-AB12-5647BCC1F5EA}" type="datetime1">
               <a:rPr lang="en-GB" smtClean="0"/>
-              <a:t>07/08/2023</a:t>
+              <a:t>13/03/2024</a:t>
             </a:fld>
             <a:endParaRPr lang="en-US"/>
           </a:p>
@@ -2063,7 +2063,7 @@
           <a:p>
             <a:fld id="{8F276179-8031-A64D-BF6B-FD962A2E0325}" type="datetime1">
               <a:rPr lang="en-GB" smtClean="0"/>
-              <a:t>07/08/2023</a:t>
+              <a:t>13/03/2024</a:t>
             </a:fld>
             <a:endParaRPr lang="en-US"/>
           </a:p>
@@ -2158,7 +2158,7 @@
           <a:p>
             <a:fld id="{0BD047C0-5E4B-8D42-8860-BF2131E0B082}" type="datetime1">
               <a:rPr lang="en-GB" smtClean="0"/>
-              <a:t>07/08/2023</a:t>
+              <a:t>13/03/2024</a:t>
             </a:fld>
             <a:endParaRPr lang="en-US"/>
           </a:p>
@@ -2433,7 +2433,7 @@
           <a:p>
             <a:fld id="{BEE0AAC6-D00F-0A4D-ACF2-D746D80F57B7}" type="datetime1">
               <a:rPr lang="en-GB" smtClean="0"/>
-              <a:t>07/08/2023</a:t>
+              <a:t>13/03/2024</a:t>
             </a:fld>
             <a:endParaRPr lang="en-US"/>
           </a:p>
@@ -2685,7 +2685,7 @@
           <a:p>
             <a:fld id="{571BE75C-CC92-0C40-A000-07855BA8B50B}" type="datetime1">
               <a:rPr lang="en-GB" smtClean="0"/>
-              <a:t>07/08/2023</a:t>
+              <a:t>13/03/2024</a:t>
             </a:fld>
             <a:endParaRPr lang="en-US"/>
           </a:p>
@@ -2896,7 +2896,7 @@
           <a:p>
             <a:fld id="{71A86137-0D67-2449-936F-D286C18A43A7}" type="datetime1">
               <a:rPr lang="en-GB" smtClean="0"/>
-              <a:t>07/08/2023</a:t>
+              <a:t>13/03/2024</a:t>
             </a:fld>
             <a:endParaRPr lang="en-US"/>
           </a:p>
@@ -3567,7 +3567,7 @@
         </p:blipFill>
         <p:spPr bwMode="auto">
           <a:xfrm>
-            <a:off x="3302663" y="4444596"/>
+            <a:off x="3302663" y="4215998"/>
             <a:ext cx="469900" cy="469900"/>
           </a:xfrm>
           <a:prstGeom prst="rect">
@@ -3614,7 +3614,7 @@
         </p:nvSpPr>
         <p:spPr bwMode="auto">
           <a:xfrm>
-            <a:off x="2634758" y="4904532"/>
+            <a:off x="2634758" y="4675934"/>
             <a:ext cx="1805711" cy="276999"/>
           </a:xfrm>
           <a:prstGeom prst="rect">
@@ -3952,226 +3952,6 @@
       </p:pic>
       <p:pic>
         <p:nvPicPr>
-          <p:cNvPr id="84" name="Graphic 17">
-            <a:extLst>
-              <a:ext uri="{FF2B5EF4-FFF2-40B4-BE49-F238E27FC236}">
-                <a16:creationId xmlns:a16="http://schemas.microsoft.com/office/drawing/2014/main" id="{8560CB5F-EA6E-8949-B816-4A4E6FE52E1E}"/>
-              </a:ext>
-            </a:extLst>
-          </p:cNvPr>
-          <p:cNvPicPr>
-            <a:picLocks noChangeAspect="1" noChangeArrowheads="1"/>
-          </p:cNvPicPr>
-          <p:nvPr/>
-        </p:nvPicPr>
-        <p:blipFill>
-          <a:blip r:embed="rId2" cstate="print">
-            <a:extLst>
-              <a:ext uri="{28A0092B-C50C-407E-A947-70E740481C1C}">
-                <a14:useLocalDpi xmlns:a14="http://schemas.microsoft.com/office/drawing/2010/main" val="0"/>
-              </a:ext>
-            </a:extLst>
-          </a:blip>
-          <a:srcRect/>
-          <a:stretch>
-            <a:fillRect/>
-          </a:stretch>
-        </p:blipFill>
-        <p:spPr bwMode="auto">
-          <a:xfrm>
-            <a:off x="3302663" y="2193879"/>
-            <a:ext cx="469900" cy="469900"/>
-          </a:xfrm>
-          <a:prstGeom prst="rect">
-            <a:avLst/>
-          </a:prstGeom>
-          <a:noFill/>
-          <a:ln>
-            <a:noFill/>
-          </a:ln>
-          <a:extLst>
-            <a:ext uri="{909E8E84-426E-40DD-AFC4-6F175D3DCCD1}">
-              <a14:hiddenFill xmlns:a14="http://schemas.microsoft.com/office/drawing/2010/main">
-                <a:solidFill>
-                  <a:srgbClr val="FFFFFF"/>
-                </a:solidFill>
-              </a14:hiddenFill>
-            </a:ext>
-            <a:ext uri="{91240B29-F687-4F45-9708-019B960494DF}">
-              <a14:hiddenLine xmlns:a14="http://schemas.microsoft.com/office/drawing/2010/main" w="9525">
-                <a:solidFill>
-                  <a:srgbClr val="000000"/>
-                </a:solidFill>
-                <a:miter lim="800000"/>
-                <a:headEnd/>
-                <a:tailEnd/>
-              </a14:hiddenLine>
-            </a:ext>
-          </a:extLst>
-        </p:spPr>
-      </p:pic>
-      <p:sp>
-        <p:nvSpPr>
-          <p:cNvPr id="85" name="TextBox 18">
-            <a:extLst>
-              <a:ext uri="{FF2B5EF4-FFF2-40B4-BE49-F238E27FC236}">
-                <a16:creationId xmlns:a16="http://schemas.microsoft.com/office/drawing/2014/main" id="{2E075880-4C60-1845-A45C-A49F05E20DD1}"/>
-              </a:ext>
-            </a:extLst>
-          </p:cNvPr>
-          <p:cNvSpPr txBox="1">
-            <a:spLocks noChangeArrowheads="1"/>
-          </p:cNvSpPr>
-          <p:nvPr/>
-        </p:nvSpPr>
-        <p:spPr bwMode="auto">
-          <a:xfrm>
-            <a:off x="2798948" y="2637417"/>
-            <a:ext cx="1477330" cy="286820"/>
-          </a:xfrm>
-          <a:prstGeom prst="rect">
-            <a:avLst/>
-          </a:prstGeom>
-          <a:noFill/>
-          <a:ln>
-            <a:noFill/>
-          </a:ln>
-          <a:extLst>
-            <a:ext uri="{909E8E84-426E-40DD-AFC4-6F175D3DCCD1}">
-              <a14:hiddenFill xmlns:a14="http://schemas.microsoft.com/office/drawing/2010/main">
-                <a:solidFill>
-                  <a:srgbClr val="FFFFFF"/>
-                </a:solidFill>
-              </a14:hiddenFill>
-            </a:ext>
-            <a:ext uri="{91240B29-F687-4F45-9708-019B960494DF}">
-              <a14:hiddenLine xmlns:a14="http://schemas.microsoft.com/office/drawing/2010/main" w="9525">
-                <a:solidFill>
-                  <a:srgbClr val="000000"/>
-                </a:solidFill>
-                <a:miter lim="800000"/>
-                <a:headEnd/>
-                <a:tailEnd/>
-              </a14:hiddenLine>
-            </a:ext>
-          </a:extLst>
-        </p:spPr>
-        <p:txBody>
-          <a:bodyPr wrap="square">
-            <a:spAutoFit/>
-          </a:bodyPr>
-          <a:lstStyle>
-            <a:lvl1pPr>
-              <a:defRPr>
-                <a:solidFill>
-                  <a:schemeClr val="tx1"/>
-                </a:solidFill>
-                <a:latin typeface="Calibri" panose="020F0502020204030204" pitchFamily="34" charset="0"/>
-              </a:defRPr>
-            </a:lvl1pPr>
-            <a:lvl2pPr marL="742950" indent="-285750">
-              <a:defRPr>
-                <a:solidFill>
-                  <a:schemeClr val="tx1"/>
-                </a:solidFill>
-                <a:latin typeface="Calibri" panose="020F0502020204030204" pitchFamily="34" charset="0"/>
-              </a:defRPr>
-            </a:lvl2pPr>
-            <a:lvl3pPr marL="1143000" indent="-228600">
-              <a:defRPr>
-                <a:solidFill>
-                  <a:schemeClr val="tx1"/>
-                </a:solidFill>
-                <a:latin typeface="Calibri" panose="020F0502020204030204" pitchFamily="34" charset="0"/>
-              </a:defRPr>
-            </a:lvl3pPr>
-            <a:lvl4pPr marL="1600200" indent="-228600">
-              <a:defRPr>
-                <a:solidFill>
-                  <a:schemeClr val="tx1"/>
-                </a:solidFill>
-                <a:latin typeface="Calibri" panose="020F0502020204030204" pitchFamily="34" charset="0"/>
-              </a:defRPr>
-            </a:lvl4pPr>
-            <a:lvl5pPr marL="2057400" indent="-228600">
-              <a:defRPr>
-                <a:solidFill>
-                  <a:schemeClr val="tx1"/>
-                </a:solidFill>
-                <a:latin typeface="Calibri" panose="020F0502020204030204" pitchFamily="34" charset="0"/>
-              </a:defRPr>
-            </a:lvl5pPr>
-            <a:lvl6pPr marL="2514600" indent="-228600" eaLnBrk="0" fontAlgn="base" hangingPunct="0">
-              <a:spcBef>
-                <a:spcPct val="0"/>
-              </a:spcBef>
-              <a:spcAft>
-                <a:spcPct val="0"/>
-              </a:spcAft>
-              <a:defRPr>
-                <a:solidFill>
-                  <a:schemeClr val="tx1"/>
-                </a:solidFill>
-                <a:latin typeface="Calibri" panose="020F0502020204030204" pitchFamily="34" charset="0"/>
-              </a:defRPr>
-            </a:lvl6pPr>
-            <a:lvl7pPr marL="2971800" indent="-228600" eaLnBrk="0" fontAlgn="base" hangingPunct="0">
-              <a:spcBef>
-                <a:spcPct val="0"/>
-              </a:spcBef>
-              <a:spcAft>
-                <a:spcPct val="0"/>
-              </a:spcAft>
-              <a:defRPr>
-                <a:solidFill>
-                  <a:schemeClr val="tx1"/>
-                </a:solidFill>
-                <a:latin typeface="Calibri" panose="020F0502020204030204" pitchFamily="34" charset="0"/>
-              </a:defRPr>
-            </a:lvl7pPr>
-            <a:lvl8pPr marL="3429000" indent="-228600" eaLnBrk="0" fontAlgn="base" hangingPunct="0">
-              <a:spcBef>
-                <a:spcPct val="0"/>
-              </a:spcBef>
-              <a:spcAft>
-                <a:spcPct val="0"/>
-              </a:spcAft>
-              <a:defRPr>
-                <a:solidFill>
-                  <a:schemeClr val="tx1"/>
-                </a:solidFill>
-                <a:latin typeface="Calibri" panose="020F0502020204030204" pitchFamily="34" charset="0"/>
-              </a:defRPr>
-            </a:lvl8pPr>
-            <a:lvl9pPr marL="3886200" indent="-228600" eaLnBrk="0" fontAlgn="base" hangingPunct="0">
-              <a:spcBef>
-                <a:spcPct val="0"/>
-              </a:spcBef>
-              <a:spcAft>
-                <a:spcPct val="0"/>
-              </a:spcAft>
-              <a:defRPr>
-                <a:solidFill>
-                  <a:schemeClr val="tx1"/>
-                </a:solidFill>
-                <a:latin typeface="Calibri" panose="020F0502020204030204" pitchFamily="34" charset="0"/>
-              </a:defRPr>
-            </a:lvl9pPr>
-          </a:lstStyle>
-          <a:p>
-            <a:pPr algn="ctr" eaLnBrk="1" hangingPunct="1"/>
-            <a:r>
-              <a:rPr lang="en-US" altLang="en-US" sz="1200" dirty="0">
-                <a:latin typeface="Arial" panose="020B0604020202020204" pitchFamily="34" charset="0"/>
-                <a:cs typeface="Arial" panose="020B0604020202020204" pitchFamily="34" charset="0"/>
-              </a:rPr>
-              <a:t>Linux bastion host</a:t>
-            </a:r>
-          </a:p>
-        </p:txBody>
-      </p:sp>
-      <p:pic>
-        <p:nvPicPr>
           <p:cNvPr id="8" name="Graphic 9">
             <a:extLst>
               <a:ext uri="{FF2B5EF4-FFF2-40B4-BE49-F238E27FC236}">
@@ -4259,7 +4039,7 @@
         </p:blipFill>
         <p:spPr bwMode="auto">
           <a:xfrm>
-            <a:off x="5117797" y="4365611"/>
+            <a:off x="5117797" y="4137013"/>
             <a:ext cx="330200" cy="330200"/>
           </a:xfrm>
           <a:prstGeom prst="rect">
@@ -4461,7 +4241,7 @@
         </p:blipFill>
         <p:spPr bwMode="auto">
           <a:xfrm>
-            <a:off x="6719820" y="4444596"/>
+            <a:off x="6719820" y="4215998"/>
             <a:ext cx="469900" cy="469900"/>
           </a:xfrm>
           <a:prstGeom prst="rect">
@@ -4508,7 +4288,7 @@
         </p:nvSpPr>
         <p:spPr bwMode="auto">
           <a:xfrm>
-            <a:off x="6051915" y="4904532"/>
+            <a:off x="6051915" y="4675934"/>
             <a:ext cx="1805711" cy="276999"/>
           </a:xfrm>
           <a:prstGeom prst="rect">
@@ -4844,226 +4624,6 @@
           </a:extLst>
         </p:spPr>
       </p:pic>
-      <p:pic>
-        <p:nvPicPr>
-          <p:cNvPr id="62" name="Graphic 17">
-            <a:extLst>
-              <a:ext uri="{FF2B5EF4-FFF2-40B4-BE49-F238E27FC236}">
-                <a16:creationId xmlns:a16="http://schemas.microsoft.com/office/drawing/2014/main" id="{8560CB5F-EA6E-8949-B816-4A4E6FE52E1E}"/>
-              </a:ext>
-            </a:extLst>
-          </p:cNvPr>
-          <p:cNvPicPr>
-            <a:picLocks noChangeAspect="1" noChangeArrowheads="1"/>
-          </p:cNvPicPr>
-          <p:nvPr/>
-        </p:nvPicPr>
-        <p:blipFill>
-          <a:blip r:embed="rId2" cstate="print">
-            <a:extLst>
-              <a:ext uri="{28A0092B-C50C-407E-A947-70E740481C1C}">
-                <a14:useLocalDpi xmlns:a14="http://schemas.microsoft.com/office/drawing/2010/main" val="0"/>
-              </a:ext>
-            </a:extLst>
-          </a:blip>
-          <a:srcRect/>
-          <a:stretch>
-            <a:fillRect/>
-          </a:stretch>
-        </p:blipFill>
-        <p:spPr bwMode="auto">
-          <a:xfrm>
-            <a:off x="6719820" y="2193879"/>
-            <a:ext cx="469900" cy="469900"/>
-          </a:xfrm>
-          <a:prstGeom prst="rect">
-            <a:avLst/>
-          </a:prstGeom>
-          <a:noFill/>
-          <a:ln>
-            <a:noFill/>
-          </a:ln>
-          <a:extLst>
-            <a:ext uri="{909E8E84-426E-40DD-AFC4-6F175D3DCCD1}">
-              <a14:hiddenFill xmlns:a14="http://schemas.microsoft.com/office/drawing/2010/main">
-                <a:solidFill>
-                  <a:srgbClr val="FFFFFF"/>
-                </a:solidFill>
-              </a14:hiddenFill>
-            </a:ext>
-            <a:ext uri="{91240B29-F687-4F45-9708-019B960494DF}">
-              <a14:hiddenLine xmlns:a14="http://schemas.microsoft.com/office/drawing/2010/main" w="9525">
-                <a:solidFill>
-                  <a:srgbClr val="000000"/>
-                </a:solidFill>
-                <a:miter lim="800000"/>
-                <a:headEnd/>
-                <a:tailEnd/>
-              </a14:hiddenLine>
-            </a:ext>
-          </a:extLst>
-        </p:spPr>
-      </p:pic>
-      <p:sp>
-        <p:nvSpPr>
-          <p:cNvPr id="63" name="TextBox 18">
-            <a:extLst>
-              <a:ext uri="{FF2B5EF4-FFF2-40B4-BE49-F238E27FC236}">
-                <a16:creationId xmlns:a16="http://schemas.microsoft.com/office/drawing/2014/main" id="{2E075880-4C60-1845-A45C-A49F05E20DD1}"/>
-              </a:ext>
-            </a:extLst>
-          </p:cNvPr>
-          <p:cNvSpPr txBox="1">
-            <a:spLocks noChangeArrowheads="1"/>
-          </p:cNvSpPr>
-          <p:nvPr/>
-        </p:nvSpPr>
-        <p:spPr bwMode="auto">
-          <a:xfrm>
-            <a:off x="6216105" y="2637417"/>
-            <a:ext cx="1477330" cy="286820"/>
-          </a:xfrm>
-          <a:prstGeom prst="rect">
-            <a:avLst/>
-          </a:prstGeom>
-          <a:noFill/>
-          <a:ln>
-            <a:noFill/>
-          </a:ln>
-          <a:extLst>
-            <a:ext uri="{909E8E84-426E-40DD-AFC4-6F175D3DCCD1}">
-              <a14:hiddenFill xmlns:a14="http://schemas.microsoft.com/office/drawing/2010/main">
-                <a:solidFill>
-                  <a:srgbClr val="FFFFFF"/>
-                </a:solidFill>
-              </a14:hiddenFill>
-            </a:ext>
-            <a:ext uri="{91240B29-F687-4F45-9708-019B960494DF}">
-              <a14:hiddenLine xmlns:a14="http://schemas.microsoft.com/office/drawing/2010/main" w="9525">
-                <a:solidFill>
-                  <a:srgbClr val="000000"/>
-                </a:solidFill>
-                <a:miter lim="800000"/>
-                <a:headEnd/>
-                <a:tailEnd/>
-              </a14:hiddenLine>
-            </a:ext>
-          </a:extLst>
-        </p:spPr>
-        <p:txBody>
-          <a:bodyPr wrap="square">
-            <a:spAutoFit/>
-          </a:bodyPr>
-          <a:lstStyle>
-            <a:lvl1pPr>
-              <a:defRPr>
-                <a:solidFill>
-                  <a:schemeClr val="tx1"/>
-                </a:solidFill>
-                <a:latin typeface="Calibri" panose="020F0502020204030204" pitchFamily="34" charset="0"/>
-              </a:defRPr>
-            </a:lvl1pPr>
-            <a:lvl2pPr marL="742950" indent="-285750">
-              <a:defRPr>
-                <a:solidFill>
-                  <a:schemeClr val="tx1"/>
-                </a:solidFill>
-                <a:latin typeface="Calibri" panose="020F0502020204030204" pitchFamily="34" charset="0"/>
-              </a:defRPr>
-            </a:lvl2pPr>
-            <a:lvl3pPr marL="1143000" indent="-228600">
-              <a:defRPr>
-                <a:solidFill>
-                  <a:schemeClr val="tx1"/>
-                </a:solidFill>
-                <a:latin typeface="Calibri" panose="020F0502020204030204" pitchFamily="34" charset="0"/>
-              </a:defRPr>
-            </a:lvl3pPr>
-            <a:lvl4pPr marL="1600200" indent="-228600">
-              <a:defRPr>
-                <a:solidFill>
-                  <a:schemeClr val="tx1"/>
-                </a:solidFill>
-                <a:latin typeface="Calibri" panose="020F0502020204030204" pitchFamily="34" charset="0"/>
-              </a:defRPr>
-            </a:lvl4pPr>
-            <a:lvl5pPr marL="2057400" indent="-228600">
-              <a:defRPr>
-                <a:solidFill>
-                  <a:schemeClr val="tx1"/>
-                </a:solidFill>
-                <a:latin typeface="Calibri" panose="020F0502020204030204" pitchFamily="34" charset="0"/>
-              </a:defRPr>
-            </a:lvl5pPr>
-            <a:lvl6pPr marL="2514600" indent="-228600" eaLnBrk="0" fontAlgn="base" hangingPunct="0">
-              <a:spcBef>
-                <a:spcPct val="0"/>
-              </a:spcBef>
-              <a:spcAft>
-                <a:spcPct val="0"/>
-              </a:spcAft>
-              <a:defRPr>
-                <a:solidFill>
-                  <a:schemeClr val="tx1"/>
-                </a:solidFill>
-                <a:latin typeface="Calibri" panose="020F0502020204030204" pitchFamily="34" charset="0"/>
-              </a:defRPr>
-            </a:lvl6pPr>
-            <a:lvl7pPr marL="2971800" indent="-228600" eaLnBrk="0" fontAlgn="base" hangingPunct="0">
-              <a:spcBef>
-                <a:spcPct val="0"/>
-              </a:spcBef>
-              <a:spcAft>
-                <a:spcPct val="0"/>
-              </a:spcAft>
-              <a:defRPr>
-                <a:solidFill>
-                  <a:schemeClr val="tx1"/>
-                </a:solidFill>
-                <a:latin typeface="Calibri" panose="020F0502020204030204" pitchFamily="34" charset="0"/>
-              </a:defRPr>
-            </a:lvl7pPr>
-            <a:lvl8pPr marL="3429000" indent="-228600" eaLnBrk="0" fontAlgn="base" hangingPunct="0">
-              <a:spcBef>
-                <a:spcPct val="0"/>
-              </a:spcBef>
-              <a:spcAft>
-                <a:spcPct val="0"/>
-              </a:spcAft>
-              <a:defRPr>
-                <a:solidFill>
-                  <a:schemeClr val="tx1"/>
-                </a:solidFill>
-                <a:latin typeface="Calibri" panose="020F0502020204030204" pitchFamily="34" charset="0"/>
-              </a:defRPr>
-            </a:lvl8pPr>
-            <a:lvl9pPr marL="3886200" indent="-228600" eaLnBrk="0" fontAlgn="base" hangingPunct="0">
-              <a:spcBef>
-                <a:spcPct val="0"/>
-              </a:spcBef>
-              <a:spcAft>
-                <a:spcPct val="0"/>
-              </a:spcAft>
-              <a:defRPr>
-                <a:solidFill>
-                  <a:schemeClr val="tx1"/>
-                </a:solidFill>
-                <a:latin typeface="Calibri" panose="020F0502020204030204" pitchFamily="34" charset="0"/>
-              </a:defRPr>
-            </a:lvl9pPr>
-          </a:lstStyle>
-          <a:p>
-            <a:pPr algn="ctr" eaLnBrk="1" hangingPunct="1"/>
-            <a:r>
-              <a:rPr lang="en-US" altLang="en-US" sz="1200" dirty="0">
-                <a:latin typeface="Arial" panose="020B0604020202020204" pitchFamily="34" charset="0"/>
-                <a:cs typeface="Arial" panose="020B0604020202020204" pitchFamily="34" charset="0"/>
-              </a:rPr>
-              <a:t>Linux bastion host</a:t>
-            </a:r>
-          </a:p>
-        </p:txBody>
-      </p:sp>
       <p:sp>
         <p:nvSpPr>
           <p:cNvPr id="76" name="Rectangle 75">
@@ -5136,172 +4696,6 @@
       </p:sp>
       <p:sp>
         <p:nvSpPr>
-          <p:cNvPr id="102" name="Rectangle 101">
-            <a:extLst>
-              <a:ext uri="{FF2B5EF4-FFF2-40B4-BE49-F238E27FC236}">
-                <a16:creationId xmlns:a16="http://schemas.microsoft.com/office/drawing/2014/main" id="{39EEFFD5-B07A-CD4C-A9C4-8DBFAB9447D6}"/>
-              </a:ext>
-            </a:extLst>
-          </p:cNvPr>
-          <p:cNvSpPr/>
-          <p:nvPr/>
-        </p:nvSpPr>
-        <p:spPr>
-          <a:xfrm>
-            <a:off x="2798948" y="2146180"/>
-            <a:ext cx="4894487" cy="787744"/>
-          </a:xfrm>
-          <a:prstGeom prst="rect">
-            <a:avLst/>
-          </a:prstGeom>
-          <a:noFill/>
-          <a:ln w="12700">
-            <a:solidFill>
-              <a:srgbClr val="D86613"/>
-            </a:solidFill>
-            <a:prstDash val="dash"/>
-          </a:ln>
-        </p:spPr>
-        <p:style>
-          <a:lnRef idx="2">
-            <a:schemeClr val="accent1">
-              <a:shade val="50000"/>
-            </a:schemeClr>
-          </a:lnRef>
-          <a:fillRef idx="1">
-            <a:schemeClr val="accent1"/>
-          </a:fillRef>
-          <a:effectRef idx="0">
-            <a:schemeClr val="accent1"/>
-          </a:effectRef>
-          <a:fontRef idx="minor">
-            <a:schemeClr val="lt1"/>
-          </a:fontRef>
-        </p:style>
-        <p:txBody>
-          <a:bodyPr tIns="91440"/>
-          <a:lstStyle/>
-          <a:p>
-            <a:pPr algn="ctr" eaLnBrk="1" fontAlgn="auto" hangingPunct="1">
-              <a:spcBef>
-                <a:spcPts val="0"/>
-              </a:spcBef>
-              <a:spcAft>
-                <a:spcPts val="0"/>
-              </a:spcAft>
-              <a:defRPr/>
-            </a:pPr>
-            <a:endParaRPr lang="en-US" sz="1200" dirty="0">
-              <a:solidFill>
-                <a:srgbClr val="D86613"/>
-              </a:solidFill>
-              <a:latin typeface="Arial" panose="020B0604020202020204" pitchFamily="34" charset="0"/>
-              <a:cs typeface="Arial" panose="020B0604020202020204" pitchFamily="34" charset="0"/>
-            </a:endParaRPr>
-          </a:p>
-          <a:p>
-            <a:pPr algn="ctr" eaLnBrk="1" fontAlgn="auto" hangingPunct="1">
-              <a:spcBef>
-                <a:spcPts val="0"/>
-              </a:spcBef>
-              <a:spcAft>
-                <a:spcPts val="0"/>
-              </a:spcAft>
-              <a:defRPr/>
-            </a:pPr>
-            <a:endParaRPr lang="en-US" sz="1200" dirty="0">
-              <a:solidFill>
-                <a:srgbClr val="D86613"/>
-              </a:solidFill>
-              <a:latin typeface="Arial" panose="020B0604020202020204" pitchFamily="34" charset="0"/>
-              <a:cs typeface="Arial" panose="020B0604020202020204" pitchFamily="34" charset="0"/>
-            </a:endParaRPr>
-          </a:p>
-          <a:p>
-            <a:pPr algn="ctr" eaLnBrk="1" fontAlgn="auto" hangingPunct="1">
-              <a:spcBef>
-                <a:spcPts val="0"/>
-              </a:spcBef>
-              <a:spcAft>
-                <a:spcPts val="0"/>
-              </a:spcAft>
-              <a:defRPr/>
-            </a:pPr>
-            <a:r>
-              <a:rPr lang="en-US" sz="1200" dirty="0">
-                <a:solidFill>
-                  <a:srgbClr val="D86613"/>
-                </a:solidFill>
-                <a:latin typeface="Arial" panose="020B0604020202020204" pitchFamily="34" charset="0"/>
-                <a:cs typeface="Arial" panose="020B0604020202020204" pitchFamily="34" charset="0"/>
-              </a:rPr>
-              <a:t>Auto Scaling group</a:t>
-            </a:r>
-          </a:p>
-        </p:txBody>
-      </p:sp>
-      <p:pic>
-        <p:nvPicPr>
-          <p:cNvPr id="103" name="Graphic 18">
-            <a:extLst>
-              <a:ext uri="{FF2B5EF4-FFF2-40B4-BE49-F238E27FC236}">
-                <a16:creationId xmlns:a16="http://schemas.microsoft.com/office/drawing/2014/main" id="{E0668E3F-1457-E041-A92E-2FF0C60C21C1}"/>
-              </a:ext>
-            </a:extLst>
-          </p:cNvPr>
-          <p:cNvPicPr>
-            <a:picLocks noChangeAspect="1" noChangeArrowheads="1"/>
-          </p:cNvPicPr>
-          <p:nvPr/>
-        </p:nvPicPr>
-        <p:blipFill>
-          <a:blip r:embed="rId6" cstate="print">
-            <a:extLst>
-              <a:ext uri="{28A0092B-C50C-407E-A947-70E740481C1C}">
-                <a14:useLocalDpi xmlns:a14="http://schemas.microsoft.com/office/drawing/2010/main" val="0"/>
-              </a:ext>
-            </a:extLst>
-          </a:blip>
-          <a:srcRect/>
-          <a:stretch>
-            <a:fillRect/>
-          </a:stretch>
-        </p:blipFill>
-        <p:spPr bwMode="auto">
-          <a:xfrm>
-            <a:off x="5117797" y="2142846"/>
-            <a:ext cx="330200" cy="330200"/>
-          </a:xfrm>
-          <a:prstGeom prst="rect">
-            <a:avLst/>
-          </a:prstGeom>
-          <a:noFill/>
-          <a:ln>
-            <a:noFill/>
-          </a:ln>
-          <a:extLst>
-            <a:ext uri="{909E8E84-426E-40DD-AFC4-6F175D3DCCD1}">
-              <a14:hiddenFill xmlns:a14="http://schemas.microsoft.com/office/drawing/2010/main">
-                <a:solidFill>
-                  <a:srgbClr val="FFFFFF"/>
-                </a:solidFill>
-              </a14:hiddenFill>
-            </a:ext>
-            <a:ext uri="{91240B29-F687-4F45-9708-019B960494DF}">
-              <a14:hiddenLine xmlns:a14="http://schemas.microsoft.com/office/drawing/2010/main" w="9525">
-                <a:solidFill>
-                  <a:srgbClr val="000000"/>
-                </a:solidFill>
-                <a:miter lim="800000"/>
-                <a:headEnd/>
-                <a:tailEnd/>
-              </a14:hiddenLine>
-            </a:ext>
-          </a:extLst>
-        </p:spPr>
-      </p:pic>
-      <p:sp>
-        <p:nvSpPr>
           <p:cNvPr id="41" name="TextBox 17">
             <a:extLst>
               <a:ext uri="{FF2B5EF4-FFF2-40B4-BE49-F238E27FC236}">
@@ -5316,7 +4710,7 @@
         </p:nvSpPr>
         <p:spPr bwMode="auto">
           <a:xfrm>
-            <a:off x="2920230" y="4076799"/>
+            <a:off x="2920230" y="2577123"/>
             <a:ext cx="1234766" cy="276999"/>
           </a:xfrm>
           <a:prstGeom prst="rect">
@@ -5490,7 +4884,7 @@
         </p:blipFill>
         <p:spPr bwMode="auto">
           <a:xfrm>
-            <a:off x="3309013" y="3618012"/>
+            <a:off x="3309013" y="2118336"/>
             <a:ext cx="457200" cy="457200"/>
           </a:xfrm>
           <a:prstGeom prst="rect">
@@ -5537,7 +4931,7 @@
         </p:nvSpPr>
         <p:spPr bwMode="auto">
           <a:xfrm>
-            <a:off x="6337387" y="4076799"/>
+            <a:off x="6337387" y="2577123"/>
             <a:ext cx="1234766" cy="276999"/>
           </a:xfrm>
           <a:prstGeom prst="rect">
@@ -5711,7 +5105,7 @@
         </p:blipFill>
         <p:spPr bwMode="auto">
           <a:xfrm>
-            <a:off x="6726170" y="3618012"/>
+            <a:off x="6726170" y="2118336"/>
             <a:ext cx="457200" cy="457200"/>
           </a:xfrm>
           <a:prstGeom prst="rect">
@@ -5887,7 +5281,7 @@
         </p:nvSpPr>
         <p:spPr bwMode="auto">
           <a:xfrm>
-            <a:off x="7870805" y="4962952"/>
+            <a:off x="7876048" y="4734352"/>
             <a:ext cx="1290638" cy="461665"/>
           </a:xfrm>
           <a:prstGeom prst="rect">
@@ -6061,7 +5455,7 @@
         </p:blipFill>
         <p:spPr bwMode="auto">
           <a:xfrm>
-            <a:off x="8287524" y="4561383"/>
+            <a:off x="8292767" y="4332783"/>
             <a:ext cx="457200" cy="457200"/>
           </a:xfrm>
           <a:prstGeom prst="rect">
@@ -6109,9 +5503,9 @@
           <p:nvPr/>
         </p:nvCxnSpPr>
         <p:spPr>
-          <a:xfrm>
-            <a:off x="7693435" y="4789983"/>
-            <a:ext cx="594089" cy="0"/>
+          <a:xfrm flipV="1">
+            <a:off x="7693435" y="4561383"/>
+            <a:ext cx="599332" cy="2"/>
           </a:xfrm>
           <a:prstGeom prst="straightConnector1">
             <a:avLst/>
@@ -6660,7 +6054,7 @@
         <p:spPr>
           <a:xfrm flipV="1">
             <a:off x="5282897" y="3903483"/>
-            <a:ext cx="0" cy="462128"/>
+            <a:ext cx="0" cy="233530"/>
           </a:xfrm>
           <a:prstGeom prst="straightConnector1">
             <a:avLst/>
@@ -6747,7 +6141,7 @@
         </p:nvSpPr>
         <p:spPr>
           <a:xfrm>
-            <a:off x="2798948" y="4367416"/>
+            <a:off x="2798948" y="4138818"/>
             <a:ext cx="4894487" cy="845134"/>
           </a:xfrm>
           <a:prstGeom prst="rect">
@@ -6868,7 +6262,7 @@
         </p:blipFill>
         <p:spPr bwMode="auto">
           <a:xfrm>
-            <a:off x="8287524" y="3704803"/>
+            <a:off x="8292767" y="3476203"/>
             <a:ext cx="457200" cy="457200"/>
           </a:xfrm>
           <a:prstGeom prst="rect">
@@ -6915,7 +6309,7 @@
         </p:nvSpPr>
         <p:spPr bwMode="auto">
           <a:xfrm>
-            <a:off x="7934305" y="4155654"/>
+            <a:off x="7939548" y="3927054"/>
             <a:ext cx="1163639" cy="261610"/>
           </a:xfrm>
           <a:prstGeom prst="rect">

</xml_diff>